<commit_message>
Create a presentation for the project
</commit_message>
<xml_diff>
--- a/docs/timeline_presentation.pptx
+++ b/docs/timeline_presentation.pptx
@@ -3313,7 +3313,7 @@
           <a:p>
             <a:fld id="{6470A552-4A57-40D4-B628-839DE445BB81}" type="datetimeFigureOut">
               <a:rPr lang="en-US" smtClean="0"/>
-              <a:t>4/4/2025</a:t>
+              <a:t>4/5/2025</a:t>
             </a:fld>
             <a:endParaRPr lang="en-US"/>
           </a:p>
@@ -3611,7 +3611,7 @@
           <a:p>
             <a:fld id="{6470A552-4A57-40D4-B628-839DE445BB81}" type="datetimeFigureOut">
               <a:rPr lang="en-US" smtClean="0"/>
-              <a:t>4/4/2025</a:t>
+              <a:t>4/5/2025</a:t>
             </a:fld>
             <a:endParaRPr lang="en-US"/>
           </a:p>
@@ -3803,7 +3803,7 @@
           <a:p>
             <a:fld id="{6470A552-4A57-40D4-B628-839DE445BB81}" type="datetimeFigureOut">
               <a:rPr lang="en-US" smtClean="0"/>
-              <a:t>4/4/2025</a:t>
+              <a:t>4/5/2025</a:t>
             </a:fld>
             <a:endParaRPr lang="en-US"/>
           </a:p>
@@ -4064,7 +4064,7 @@
           <a:p>
             <a:fld id="{6470A552-4A57-40D4-B628-839DE445BB81}" type="datetimeFigureOut">
               <a:rPr lang="en-US" smtClean="0"/>
-              <a:t>4/4/2025</a:t>
+              <a:t>4/5/2025</a:t>
             </a:fld>
             <a:endParaRPr lang="en-US"/>
           </a:p>
@@ -4488,7 +4488,7 @@
           <a:p>
             <a:fld id="{6470A552-4A57-40D4-B628-839DE445BB81}" type="datetimeFigureOut">
               <a:rPr lang="en-US" smtClean="0"/>
-              <a:t>4/4/2025</a:t>
+              <a:t>4/5/2025</a:t>
             </a:fld>
             <a:endParaRPr lang="en-US"/>
           </a:p>
@@ -5025,7 +5025,7 @@
           <a:p>
             <a:fld id="{6470A552-4A57-40D4-B628-839DE445BB81}" type="datetimeFigureOut">
               <a:rPr lang="en-US" smtClean="0"/>
-              <a:t>4/4/2025</a:t>
+              <a:t>4/5/2025</a:t>
             </a:fld>
             <a:endParaRPr lang="en-US"/>
           </a:p>
@@ -5889,7 +5889,7 @@
           <a:p>
             <a:fld id="{6470A552-4A57-40D4-B628-839DE445BB81}" type="datetimeFigureOut">
               <a:rPr lang="en-US" smtClean="0"/>
-              <a:t>4/4/2025</a:t>
+              <a:t>4/5/2025</a:t>
             </a:fld>
             <a:endParaRPr lang="en-US"/>
           </a:p>
@@ -6059,7 +6059,7 @@
           <a:p>
             <a:fld id="{6470A552-4A57-40D4-B628-839DE445BB81}" type="datetimeFigureOut">
               <a:rPr lang="en-US" smtClean="0"/>
-              <a:t>4/4/2025</a:t>
+              <a:t>4/5/2025</a:t>
             </a:fld>
             <a:endParaRPr lang="en-US"/>
           </a:p>
@@ -6243,7 +6243,7 @@
           <a:p>
             <a:fld id="{6470A552-4A57-40D4-B628-839DE445BB81}" type="datetimeFigureOut">
               <a:rPr lang="en-US" smtClean="0"/>
-              <a:t>4/4/2025</a:t>
+              <a:t>4/5/2025</a:t>
             </a:fld>
             <a:endParaRPr lang="en-US"/>
           </a:p>
@@ -6413,7 +6413,7 @@
           <a:p>
             <a:fld id="{6470A552-4A57-40D4-B628-839DE445BB81}" type="datetimeFigureOut">
               <a:rPr lang="en-US" smtClean="0"/>
-              <a:t>4/4/2025</a:t>
+              <a:t>4/5/2025</a:t>
             </a:fld>
             <a:endParaRPr lang="en-US"/>
           </a:p>
@@ -6657,7 +6657,7 @@
           <a:p>
             <a:fld id="{6470A552-4A57-40D4-B628-839DE445BB81}" type="datetimeFigureOut">
               <a:rPr lang="en-US" smtClean="0"/>
-              <a:t>4/4/2025</a:t>
+              <a:t>4/5/2025</a:t>
             </a:fld>
             <a:endParaRPr lang="en-US"/>
           </a:p>
@@ -6893,7 +6893,7 @@
           <a:p>
             <a:fld id="{6470A552-4A57-40D4-B628-839DE445BB81}" type="datetimeFigureOut">
               <a:rPr lang="en-US" smtClean="0"/>
-              <a:t>4/4/2025</a:t>
+              <a:t>4/5/2025</a:t>
             </a:fld>
             <a:endParaRPr lang="en-US"/>
           </a:p>
@@ -7359,7 +7359,7 @@
           <a:p>
             <a:fld id="{6470A552-4A57-40D4-B628-839DE445BB81}" type="datetimeFigureOut">
               <a:rPr lang="en-US" smtClean="0"/>
-              <a:t>4/4/2025</a:t>
+              <a:t>4/5/2025</a:t>
             </a:fld>
             <a:endParaRPr lang="en-US"/>
           </a:p>
@@ -7477,7 +7477,7 @@
           <a:p>
             <a:fld id="{6470A552-4A57-40D4-B628-839DE445BB81}" type="datetimeFigureOut">
               <a:rPr lang="en-US" smtClean="0"/>
-              <a:t>4/4/2025</a:t>
+              <a:t>4/5/2025</a:t>
             </a:fld>
             <a:endParaRPr lang="en-US"/>
           </a:p>
@@ -7572,7 +7572,7 @@
           <a:p>
             <a:fld id="{6470A552-4A57-40D4-B628-839DE445BB81}" type="datetimeFigureOut">
               <a:rPr lang="en-US" smtClean="0"/>
-              <a:t>4/4/2025</a:t>
+              <a:t>4/5/2025</a:t>
             </a:fld>
             <a:endParaRPr lang="en-US"/>
           </a:p>
@@ -7827,7 +7827,7 @@
           <a:p>
             <a:fld id="{6470A552-4A57-40D4-B628-839DE445BB81}" type="datetimeFigureOut">
               <a:rPr lang="en-US" smtClean="0"/>
-              <a:t>4/4/2025</a:t>
+              <a:t>4/5/2025</a:t>
             </a:fld>
             <a:endParaRPr lang="en-US"/>
           </a:p>
@@ -8127,7 +8127,7 @@
           <a:p>
             <a:fld id="{6470A552-4A57-40D4-B628-839DE445BB81}" type="datetimeFigureOut">
               <a:rPr lang="en-US" smtClean="0"/>
-              <a:t>4/4/2025</a:t>
+              <a:t>4/5/2025</a:t>
             </a:fld>
             <a:endParaRPr lang="en-US"/>
           </a:p>
@@ -8361,7 +8361,7 @@
           <a:p>
             <a:fld id="{6470A552-4A57-40D4-B628-839DE445BB81}" type="datetimeFigureOut">
               <a:rPr lang="en-US" smtClean="0"/>
-              <a:t>4/4/2025</a:t>
+              <a:t>4/5/2025</a:t>
             </a:fld>
             <a:endParaRPr lang="en-US"/>
           </a:p>
@@ -12217,8 +12217,8 @@
         </p:blipFill>
         <p:spPr>
           <a:xfrm>
-            <a:off x="424364" y="1678986"/>
-            <a:ext cx="2507413" cy="3233961"/>
+            <a:off x="550653" y="1689721"/>
+            <a:ext cx="2507413" cy="2990345"/>
           </a:xfrm>
           <a:prstGeom prst="rect">
             <a:avLst/>
@@ -12239,7 +12239,7 @@
         </p:nvSpPr>
         <p:spPr>
           <a:xfrm>
-            <a:off x="424364" y="4993559"/>
+            <a:off x="424364" y="4880031"/>
             <a:ext cx="2759993" cy="461665"/>
           </a:xfrm>
           <a:prstGeom prst="rect">
@@ -12295,8 +12295,8 @@
         </p:nvSpPr>
         <p:spPr>
           <a:xfrm>
-            <a:off x="229894" y="5545167"/>
-            <a:ext cx="2896351" cy="461665"/>
+            <a:off x="694090" y="5341696"/>
+            <a:ext cx="2220538" cy="461665"/>
           </a:xfrm>
           <a:prstGeom prst="rect">
             <a:avLst/>
@@ -12378,7 +12378,7 @@
         </p:nvSpPr>
         <p:spPr>
           <a:xfrm>
-            <a:off x="3751416" y="5545167"/>
+            <a:off x="3751416" y="5341695"/>
             <a:ext cx="1711420" cy="1077218"/>
           </a:xfrm>
           <a:prstGeom prst="rect">
@@ -12488,7 +12488,7 @@
         </p:nvSpPr>
         <p:spPr>
           <a:xfrm>
-            <a:off x="6706794" y="5535836"/>
+            <a:off x="6618562" y="5341499"/>
             <a:ext cx="1711420" cy="1077217"/>
           </a:xfrm>
           <a:prstGeom prst="rect">
@@ -12598,8 +12598,8 @@
         </p:nvSpPr>
         <p:spPr>
           <a:xfrm>
-            <a:off x="9440083" y="5535836"/>
-            <a:ext cx="2094006" cy="707886"/>
+            <a:off x="8915975" y="5341696"/>
+            <a:ext cx="2798213" cy="461665"/>
           </a:xfrm>
           <a:prstGeom prst="rect">
             <a:avLst/>
@@ -12612,6 +12612,7 @@
           </a:bodyPr>
           <a:lstStyle/>
           <a:p>
+            <a:pPr algn="ctr"/>
             <a:r>
               <a:rPr lang="en-US" sz="2400" b="1" dirty="0">
                 <a:ln>
@@ -12631,38 +12632,11 @@
                   </a:outerShdw>
                 </a:effectLst>
                 <a:latin typeface="Aharoni" panose="02010803020104030203" pitchFamily="2" charset="-79"/>
+                <a:ea typeface="+mj-ea"/>
                 <a:cs typeface="Aharoni" panose="02010803020104030203" pitchFamily="2" charset="-79"/>
               </a:rPr>
-              <a:t>Developer</a:t>
+              <a:t>Quality assurance</a:t>
             </a:r>
-            <a:endParaRPr lang="en-US" sz="2400" b="1" dirty="0">
-              <a:ln>
-                <a:solidFill>
-                  <a:schemeClr val="bg1">
-                    <a:lumMod val="75000"/>
-                    <a:lumOff val="25000"/>
-                    <a:alpha val="10000"/>
-                  </a:schemeClr>
-                </a:solidFill>
-              </a:ln>
-              <a:effectLst>
-                <a:outerShdw blurRad="9525" dist="25400" dir="14640000" algn="tl" rotWithShape="0">
-                  <a:schemeClr val="bg1">
-                    <a:alpha val="30000"/>
-                  </a:schemeClr>
-                </a:outerShdw>
-              </a:effectLst>
-              <a:latin typeface="Aharoni" panose="02010803020104030203" pitchFamily="2" charset="-79"/>
-              <a:ea typeface="+mj-ea"/>
-              <a:cs typeface="Aharoni" panose="02010803020104030203" pitchFamily="2" charset="-79"/>
-            </a:endParaRPr>
-          </a:p>
-          <a:p>
-            <a:endParaRPr lang="en-US" sz="1600" dirty="0">
-              <a:solidFill>
-                <a:schemeClr val="tx1"/>
-              </a:solidFill>
-            </a:endParaRPr>
           </a:p>
         </p:txBody>
       </p:sp>
@@ -12680,7 +12654,7 @@
         </p:nvSpPr>
         <p:spPr>
           <a:xfrm>
-            <a:off x="8862531" y="4998925"/>
+            <a:off x="8862531" y="4879833"/>
             <a:ext cx="2905105" cy="461665"/>
           </a:xfrm>
           <a:prstGeom prst="rect">
@@ -12736,7 +12710,7 @@
         </p:nvSpPr>
         <p:spPr>
           <a:xfrm>
-            <a:off x="3327107" y="4990002"/>
+            <a:off x="3327106" y="4880030"/>
             <a:ext cx="2560041" cy="461665"/>
           </a:xfrm>
           <a:prstGeom prst="rect">
@@ -12790,7 +12764,7 @@
         </p:nvSpPr>
         <p:spPr>
           <a:xfrm>
-            <a:off x="6304854" y="4998926"/>
+            <a:off x="6299624" y="4879834"/>
             <a:ext cx="2537486" cy="461665"/>
           </a:xfrm>
           <a:prstGeom prst="rect">
@@ -12859,8 +12833,55 @@
         </p:blipFill>
         <p:spPr bwMode="auto">
           <a:xfrm>
-            <a:off x="6216622" y="1689723"/>
-            <a:ext cx="2515301" cy="3233958"/>
+            <a:off x="6216622" y="1689722"/>
+            <a:ext cx="2515301" cy="3002593"/>
+          </a:xfrm>
+          <a:prstGeom prst="rect">
+            <a:avLst/>
+          </a:prstGeom>
+          <a:noFill/>
+          <a:extLst>
+            <a:ext uri="{909E8E84-426E-40DD-AFC4-6F175D3DCCD1}">
+              <a14:hiddenFill xmlns:a14="http://schemas.microsoft.com/office/drawing/2010/main">
+                <a:solidFill>
+                  <a:srgbClr val="FFFFFF"/>
+                </a:solidFill>
+              </a14:hiddenFill>
+            </a:ext>
+          </a:extLst>
+        </p:spPr>
+      </p:pic>
+      <p:pic>
+        <p:nvPicPr>
+          <p:cNvPr id="1026" name="Picture 2" descr="https://cdn.discordapp.com/attachments/1313569052811333716/1352900644406820927/tmp_bbbdf389-e8be-497d-ab93-f466ab4dbd2f.jpg?ex=67f17ea9&amp;is=67f02d29&amp;hm=5f407e5d8ed99e285ceba265e19d6810938c727ea9c20e6312bc85048a2599bf&amp;">
+            <a:extLst>
+              <a:ext uri="{FF2B5EF4-FFF2-40B4-BE49-F238E27FC236}">
+                <a16:creationId xmlns:a16="http://schemas.microsoft.com/office/drawing/2014/main" id="{9B311A63-F49A-4F93-AD78-7EDE4C3C9062}"/>
+              </a:ext>
+            </a:extLst>
+          </p:cNvPr>
+          <p:cNvPicPr>
+            <a:picLocks noChangeAspect="1" noChangeArrowheads="1"/>
+          </p:cNvPicPr>
+          <p:nvPr/>
+        </p:nvPicPr>
+        <p:blipFill>
+          <a:blip r:embed="rId4">
+            <a:extLst>
+              <a:ext uri="{28A0092B-C50C-407E-A947-70E740481C1C}">
+                <a14:useLocalDpi xmlns:a14="http://schemas.microsoft.com/office/drawing/2010/main" val="0"/>
+              </a:ext>
+            </a:extLst>
+          </a:blip>
+          <a:srcRect/>
+          <a:stretch>
+            <a:fillRect/>
+          </a:stretch>
+        </p:blipFill>
+        <p:spPr bwMode="auto">
+          <a:xfrm>
+            <a:off x="9057432" y="1689723"/>
+            <a:ext cx="2515301" cy="3002592"/>
           </a:xfrm>
           <a:prstGeom prst="rect">
             <a:avLst/>
@@ -13404,17 +13425,20 @@
         </p:nvSpPr>
         <p:spPr>
           <a:xfrm>
-            <a:off x="1377779" y="2109440"/>
-            <a:ext cx="9425793" cy="3545404"/>
+            <a:off x="913795" y="1788596"/>
+            <a:ext cx="10353762" cy="4586135"/>
           </a:xfrm>
         </p:spPr>
         <p:txBody>
           <a:bodyPr>
-            <a:normAutofit fontScale="92500" lnSpcReduction="10000"/>
+            <a:normAutofit/>
           </a:bodyPr>
           <a:lstStyle/>
           <a:p>
             <a:pPr marL="36900" indent="0" algn="just">
+              <a:spcAft>
+                <a:spcPts val="1200"/>
+              </a:spcAft>
               <a:buNone/>
             </a:pPr>
             <a:r>
@@ -13427,7 +13451,31 @@
                 <a:ea typeface="+mj-ea"/>
                 <a:cs typeface="Aharoni" panose="02010803020104030203" pitchFamily="2" charset="-79"/>
               </a:rPr>
-              <a:t>Our team decided to make a finance application with a text-based user interface. For this project we decided to use C++ as a programming language and the dialog application which is based on Ncurses.</a:t>
+              <a:t>Our team decided to make a program</a:t>
+            </a:r>
+            <a:r>
+              <a:rPr lang="ru-RU" sz="4200" dirty="0">
+                <a:solidFill>
+                  <a:schemeClr val="tx1"/>
+                </a:solidFill>
+                <a:effectLst/>
+                <a:latin typeface="Aharoni" panose="02010803020104030203" pitchFamily="2" charset="-79"/>
+                <a:ea typeface="+mj-ea"/>
+                <a:cs typeface="Aharoni" panose="02010803020104030203" pitchFamily="2" charset="-79"/>
+              </a:rPr>
+              <a:t> </a:t>
+            </a:r>
+            <a:r>
+              <a:rPr lang="en-US" sz="4200" dirty="0">
+                <a:solidFill>
+                  <a:schemeClr val="tx1"/>
+                </a:solidFill>
+                <a:effectLst/>
+                <a:latin typeface="Aharoni" panose="02010803020104030203" pitchFamily="2" charset="-79"/>
+                <a:ea typeface="+mj-ea"/>
+                <a:cs typeface="Aharoni" panose="02010803020104030203" pitchFamily="2" charset="-79"/>
+              </a:rPr>
+              <a:t>for registering and managing historical events using linked lists with a text-based user interface. For this project we decided to use C++ as a programming language.</a:t>
             </a:r>
           </a:p>
           <a:p>

</xml_diff>

<commit_message>
Add team  member photos to presentation
</commit_message>
<xml_diff>
--- a/docs/timeline_presentation.pptx
+++ b/docs/timeline_presentation.pptx
@@ -116,6 +116,32 @@
     </p:ext>
   </p:extLst>
 </p:presentation>
+</file>
+
+<file path=ppt/commentAuthors.xml><?xml version="1.0" encoding="utf-8"?>
+<p:cmAuthorLst xmlns:a="http://schemas.openxmlformats.org/drawingml/2006/main" xmlns:r="http://schemas.openxmlformats.org/officeDocument/2006/relationships" xmlns:p="http://schemas.openxmlformats.org/presentationml/2006/main">
+  <p:cmAuthor id="1" name="Цветан П. Жеков" initials="ЦПЖ" lastIdx="1" clrIdx="0">
+    <p:extLst>
+      <p:ext uri="{19B8F6BF-5375-455C-9EA6-DF929625EA0E}">
+        <p15:presenceInfo xmlns:p15="http://schemas.microsoft.com/office/powerpoint/2012/main" userId="S-1-5-21-1744220161-1108611565-2903985953-1003" providerId="AD"/>
+      </p:ext>
+    </p:extLst>
+  </p:cmAuthor>
+</p:cmAuthorLst>
+</file>
+
+<file path=ppt/comments/comment1.xml><?xml version="1.0" encoding="utf-8"?>
+<p:cmLst xmlns:a="http://schemas.openxmlformats.org/drawingml/2006/main" xmlns:r="http://schemas.openxmlformats.org/officeDocument/2006/relationships" xmlns:p="http://schemas.openxmlformats.org/presentationml/2006/main">
+  <p:cm authorId="1" dt="2025-04-05T18:49:21.389" idx="1">
+    <p:pos x="3675" y="1064"/>
+    <p:text>Казах му да ми даде по-добра снимка, но той отказа.</p:text>
+    <p:extLst>
+      <p:ext uri="{C676402C-5697-4E1C-873F-D02D1690AC5C}">
+        <p15:threadingInfo xmlns:p15="http://schemas.microsoft.com/office/powerpoint/2012/main" timeZoneBias="-180"/>
+      </p:ext>
+    </p:extLst>
+  </p:cm>
+</p:cmLst>
 </file>
 
 <file path=ppt/diagrams/colors1.xml><?xml version="1.0" encoding="utf-8"?>
@@ -12898,6 +12924,53 @@
           </a:extLst>
         </p:spPr>
       </p:pic>
+      <p:pic>
+        <p:nvPicPr>
+          <p:cNvPr id="3" name="Picture 2" descr="https://cdn.discordapp.com/attachments/1313569052811333716/1352998172980674681/image.png?ex=67f2823d&amp;is=67f130bd&amp;hm=16370899a14df9150c66de00e882c1cf5b01254d8e5258ad5c5fb331c0d2535c&amp;">
+            <a:extLst>
+              <a:ext uri="{FF2B5EF4-FFF2-40B4-BE49-F238E27FC236}">
+                <a16:creationId xmlns:a16="http://schemas.microsoft.com/office/drawing/2014/main" id="{FCA372B7-4784-4E42-8AD8-E14184650D53}"/>
+              </a:ext>
+            </a:extLst>
+          </p:cNvPr>
+          <p:cNvPicPr>
+            <a:picLocks noChangeAspect="1" noChangeArrowheads="1"/>
+          </p:cNvPicPr>
+          <p:nvPr/>
+        </p:nvPicPr>
+        <p:blipFill>
+          <a:blip r:embed="rId5">
+            <a:extLst>
+              <a:ext uri="{28A0092B-C50C-407E-A947-70E740481C1C}">
+                <a14:useLocalDpi xmlns:a14="http://schemas.microsoft.com/office/drawing/2010/main" val="0"/>
+              </a:ext>
+            </a:extLst>
+          </a:blip>
+          <a:srcRect/>
+          <a:stretch>
+            <a:fillRect/>
+          </a:stretch>
+        </p:blipFill>
+        <p:spPr bwMode="auto">
+          <a:xfrm>
+            <a:off x="3309541" y="1689722"/>
+            <a:ext cx="2524461" cy="3002594"/>
+          </a:xfrm>
+          <a:prstGeom prst="rect">
+            <a:avLst/>
+          </a:prstGeom>
+          <a:noFill/>
+          <a:extLst>
+            <a:ext uri="{909E8E84-426E-40DD-AFC4-6F175D3DCCD1}">
+              <a14:hiddenFill xmlns:a14="http://schemas.microsoft.com/office/drawing/2010/main">
+                <a:solidFill>
+                  <a:srgbClr val="FFFFFF"/>
+                </a:solidFill>
+              </a14:hiddenFill>
+            </a:ext>
+          </a:extLst>
+        </p:spPr>
+      </p:pic>
     </p:spTree>
     <p:extLst>
       <p:ext uri="{BB962C8B-B14F-4D97-AF65-F5344CB8AC3E}">
@@ -13275,6 +13348,76 @@
                                         <p:cTn id="34" dur="1000"/>
                                         <p:tgtEl>
                                           <p:spTgt spid="17"/>
+                                        </p:tgtEl>
+                                      </p:cBhvr>
+                                    </p:animEffect>
+                                  </p:childTnLst>
+                                </p:cTn>
+                              </p:par>
+                              <p:par>
+                                <p:cTn id="35" presetID="16" presetClass="entr" presetSubtype="21" fill="hold" nodeType="withEffect">
+                                  <p:stCondLst>
+                                    <p:cond delay="0"/>
+                                  </p:stCondLst>
+                                  <p:childTnLst>
+                                    <p:set>
+                                      <p:cBhvr>
+                                        <p:cTn id="36" dur="1" fill="hold">
+                                          <p:stCondLst>
+                                            <p:cond delay="0"/>
+                                          </p:stCondLst>
+                                        </p:cTn>
+                                        <p:tgtEl>
+                                          <p:spTgt spid="3"/>
+                                        </p:tgtEl>
+                                        <p:attrNameLst>
+                                          <p:attrName>style.visibility</p:attrName>
+                                        </p:attrNameLst>
+                                      </p:cBhvr>
+                                      <p:to>
+                                        <p:strVal val="visible"/>
+                                      </p:to>
+                                    </p:set>
+                                    <p:animEffect transition="in" filter="barn(inVertical)">
+                                      <p:cBhvr>
+                                        <p:cTn id="37" dur="1000"/>
+                                        <p:tgtEl>
+                                          <p:spTgt spid="3"/>
+                                        </p:tgtEl>
+                                      </p:cBhvr>
+                                    </p:animEffect>
+                                  </p:childTnLst>
+                                </p:cTn>
+                              </p:par>
+                              <p:par>
+                                <p:cTn id="38" presetID="16" presetClass="entr" presetSubtype="21" fill="hold" nodeType="withEffect">
+                                  <p:stCondLst>
+                                    <p:cond delay="0"/>
+                                  </p:stCondLst>
+                                  <p:childTnLst>
+                                    <p:set>
+                                      <p:cBhvr>
+                                        <p:cTn id="39" dur="1" fill="hold">
+                                          <p:stCondLst>
+                                            <p:cond delay="0"/>
+                                          </p:stCondLst>
+                                        </p:cTn>
+                                        <p:tgtEl>
+                                          <p:spTgt spid="1026"/>
+                                        </p:tgtEl>
+                                        <p:attrNameLst>
+                                          <p:attrName>style.visibility</p:attrName>
+                                        </p:attrNameLst>
+                                      </p:cBhvr>
+                                      <p:to>
+                                        <p:strVal val="visible"/>
+                                      </p:to>
+                                    </p:set>
+                                    <p:animEffect transition="in" filter="barn(inVertical)">
+                                      <p:cBhvr>
+                                        <p:cTn id="40" dur="1000"/>
+                                        <p:tgtEl>
+                                          <p:spTgt spid="1026"/>
                                         </p:tgtEl>
                                       </p:cBhvr>
                                     </p:animEffect>

</xml_diff>